<commit_message>
report - from david, ignore highlights/comments, not where where a clean one is.
</commit_message>
<xml_diff>
--- a/CanCURVE_IntroductionSkeleton.pptx
+++ b/CanCURVE_IntroductionSkeleton.pptx
@@ -5,7 +5,7 @@
     <p:sldMasterId id="2147483660" r:id="rId1"/>
   </p:sldMasterIdLst>
   <p:notesMasterIdLst>
-    <p:notesMasterId r:id="rId38"/>
+    <p:notesMasterId r:id="rId39"/>
   </p:notesMasterIdLst>
   <p:sldIdLst>
     <p:sldId id="256" r:id="rId2"/>
@@ -30,25 +30,26 @@
     <p:sldId id="309" r:id="rId21"/>
     <p:sldId id="310" r:id="rId22"/>
     <p:sldId id="292" r:id="rId23"/>
-    <p:sldId id="312" r:id="rId24"/>
-    <p:sldId id="313" r:id="rId25"/>
-    <p:sldId id="366" r:id="rId26"/>
-    <p:sldId id="336" r:id="rId27"/>
-    <p:sldId id="338" r:id="rId28"/>
-    <p:sldId id="352" r:id="rId29"/>
-    <p:sldId id="367" r:id="rId30"/>
-    <p:sldId id="347" r:id="rId31"/>
-    <p:sldId id="349" r:id="rId32"/>
-    <p:sldId id="348" r:id="rId33"/>
-    <p:sldId id="350" r:id="rId34"/>
-    <p:sldId id="351" r:id="rId35"/>
-    <p:sldId id="342" r:id="rId36"/>
-    <p:sldId id="341" r:id="rId37"/>
+    <p:sldId id="368" r:id="rId24"/>
+    <p:sldId id="312" r:id="rId25"/>
+    <p:sldId id="313" r:id="rId26"/>
+    <p:sldId id="366" r:id="rId27"/>
+    <p:sldId id="336" r:id="rId28"/>
+    <p:sldId id="338" r:id="rId29"/>
+    <p:sldId id="352" r:id="rId30"/>
+    <p:sldId id="367" r:id="rId31"/>
+    <p:sldId id="347" r:id="rId32"/>
+    <p:sldId id="349" r:id="rId33"/>
+    <p:sldId id="348" r:id="rId34"/>
+    <p:sldId id="350" r:id="rId35"/>
+    <p:sldId id="351" r:id="rId36"/>
+    <p:sldId id="342" r:id="rId37"/>
+    <p:sldId id="341" r:id="rId38"/>
   </p:sldIdLst>
   <p:sldSz cx="12192000" cy="6858000"/>
   <p:notesSz cx="6858000" cy="9144000"/>
   <p:custDataLst>
-    <p:tags r:id="rId39"/>
+    <p:tags r:id="rId40"/>
   </p:custDataLst>
   <p:defaultTextStyle>
     <a:defPPr>
@@ -4191,7 +4192,7 @@
           </a:lstStyle>
           <a:p>
             <a:fld id="{D934E296-C4D0-4090-A181-CC3692BEE8A0}" type="datetimeFigureOut">
-              <a:t>3/20/2024</a:t>
+              <a:t>3/21/2024</a:t>
             </a:fld>
             <a:endParaRPr lang="en-US"/>
           </a:p>
@@ -5360,7 +5361,7 @@
           <a:p>
             <a:fld id="{BD162A13-03F8-C048-B959-2E6A5B43C267}" type="datetime1">
               <a:rPr lang="en-CA" smtClean="0"/>
-              <a:t>2024-03-20</a:t>
+              <a:t>2024-03-21</a:t>
             </a:fld>
             <a:endParaRPr lang="en-US"/>
           </a:p>
@@ -5587,7 +5588,7 @@
           <a:p>
             <a:fld id="{57C6B955-1AEC-724D-A0DC-4EB48B6B0BF5}" type="datetime1">
               <a:rPr lang="en-CA" smtClean="0"/>
-              <a:t>2024-03-20</a:t>
+              <a:t>2024-03-21</a:t>
             </a:fld>
             <a:endParaRPr lang="en-US"/>
           </a:p>
@@ -5788,7 +5789,7 @@
             <a:fld id="{268858C0-6DDE-9444-BC31-866ED9DFCD8E}" type="datetime1">
               <a:rPr lang="en-CA" smtClean="0"/>
               <a:pPr/>
-              <a:t>2024-03-20</a:t>
+              <a:t>2024-03-21</a:t>
             </a:fld>
             <a:endParaRPr lang="en-US"/>
           </a:p>
@@ -6246,7 +6247,7 @@
             <a:fld id="{268858C0-6DDE-9444-BC31-866ED9DFCD8E}" type="datetime1">
               <a:rPr lang="en-CA" smtClean="0"/>
               <a:pPr/>
-              <a:t>2024-03-20</a:t>
+              <a:t>2024-03-21</a:t>
             </a:fld>
             <a:endParaRPr lang="en-US"/>
           </a:p>
@@ -6439,7 +6440,7 @@
           <a:p>
             <a:fld id="{89BDEEE4-E5AE-4336-8D16-9AF32365A250}" type="datetimeFigureOut">
               <a:rPr lang="en-CA" smtClean="0"/>
-              <a:t>2024-03-20</a:t>
+              <a:t>2024-03-21</a:t>
             </a:fld>
             <a:endParaRPr lang="en-CA"/>
           </a:p>
@@ -6718,7 +6719,7 @@
             <a:fld id="{268858C0-6DDE-9444-BC31-866ED9DFCD8E}" type="datetime1">
               <a:rPr lang="en-CA" smtClean="0"/>
               <a:pPr/>
-              <a:t>2024-03-20</a:t>
+              <a:t>2024-03-21</a:t>
             </a:fld>
             <a:endParaRPr lang="en-US"/>
           </a:p>
@@ -7000,7 +7001,7 @@
           <a:p>
             <a:fld id="{C456039D-FA2F-F446-B515-A25EA0F25CD4}" type="datetime1">
               <a:rPr lang="en-CA" smtClean="0"/>
-              <a:t>2024-03-20</a:t>
+              <a:t>2024-03-21</a:t>
             </a:fld>
             <a:endParaRPr lang="en-US"/>
           </a:p>
@@ -7289,7 +7290,7 @@
           <a:p>
             <a:fld id="{8CE6990A-28E2-2241-82B9-77C01C864E0E}" type="datetime1">
               <a:rPr lang="en-CA" smtClean="0"/>
-              <a:t>2024-03-20</a:t>
+              <a:t>2024-03-21</a:t>
             </a:fld>
             <a:endParaRPr lang="en-US"/>
           </a:p>
@@ -7720,7 +7721,7 @@
           <a:p>
             <a:fld id="{7623CBA0-B8BE-454E-9320-1397925DEF46}" type="datetime1">
               <a:rPr lang="en-CA" smtClean="0"/>
-              <a:t>2024-03-20</a:t>
+              <a:t>2024-03-21</a:t>
             </a:fld>
             <a:endParaRPr lang="en-US"/>
           </a:p>
@@ -7885,7 +7886,7 @@
           <a:p>
             <a:fld id="{F6F398DA-F13D-9644-8FFD-469E8B6CEC02}" type="datetime1">
               <a:rPr lang="en-CA" smtClean="0"/>
-              <a:t>2024-03-20</a:t>
+              <a:t>2024-03-21</a:t>
             </a:fld>
             <a:endParaRPr lang="en-US"/>
           </a:p>
@@ -8014,7 +8015,7 @@
           <a:p>
             <a:fld id="{5FE6AF57-68DC-5241-AA7B-E116E226E515}" type="datetime1">
               <a:rPr lang="en-CA" smtClean="0"/>
-              <a:t>2024-03-20</a:t>
+              <a:t>2024-03-21</a:t>
             </a:fld>
             <a:endParaRPr lang="en-US"/>
           </a:p>
@@ -8344,7 +8345,7 @@
           <a:p>
             <a:fld id="{79C17373-5A5E-4B47-A8E3-F30B8EF2A23E}" type="datetime1">
               <a:rPr lang="en-CA" smtClean="0"/>
-              <a:t>2024-03-20</a:t>
+              <a:t>2024-03-21</a:t>
             </a:fld>
             <a:endParaRPr lang="en-US"/>
           </a:p>
@@ -8651,7 +8652,7 @@
           <a:p>
             <a:fld id="{D7DD4C1F-7783-E041-9472-24F46D16163B}" type="datetime1">
               <a:rPr lang="en-CA" smtClean="0"/>
-              <a:t>2024-03-20</a:t>
+              <a:t>2024-03-21</a:t>
             </a:fld>
             <a:endParaRPr lang="en-US"/>
           </a:p>
@@ -8904,7 +8905,7 @@
             <a:fld id="{268858C0-6DDE-9444-BC31-866ED9DFCD8E}" type="datetime1">
               <a:rPr lang="en-CA" smtClean="0"/>
               <a:pPr/>
-              <a:t>2024-03-20</a:t>
+              <a:t>2024-03-21</a:t>
             </a:fld>
             <a:endParaRPr lang="en-US"/>
           </a:p>
@@ -25163,6 +25164,187 @@
           <p:cNvPr id="2" name="Title 1">
             <a:extLst>
               <a:ext uri="{FF2B5EF4-FFF2-40B4-BE49-F238E27FC236}">
+                <a16:creationId xmlns:a16="http://schemas.microsoft.com/office/drawing/2014/main" id="{31A1F077-D172-0A15-7D51-E9E163A88445}"/>
+              </a:ext>
+            </a:extLst>
+          </p:cNvPr>
+          <p:cNvSpPr>
+            <a:spLocks noGrp="1"/>
+          </p:cNvSpPr>
+          <p:nvPr>
+            <p:ph type="title"/>
+          </p:nvPr>
+        </p:nvSpPr>
+        <p:spPr/>
+        <p:txBody>
+          <a:bodyPr/>
+          <a:lstStyle/>
+          <a:p>
+            <a:r>
+              <a:rPr lang="en-US" dirty="0"/>
+              <a:t>Things to consider in Design:</a:t>
+            </a:r>
+          </a:p>
+        </p:txBody>
+      </p:sp>
+      <p:sp>
+        <p:nvSpPr>
+          <p:cNvPr id="3" name="Slide Number Placeholder 2">
+            <a:extLst>
+              <a:ext uri="{FF2B5EF4-FFF2-40B4-BE49-F238E27FC236}">
+                <a16:creationId xmlns:a16="http://schemas.microsoft.com/office/drawing/2014/main" id="{D7B614F5-4839-BB02-A56A-577611090AC4}"/>
+              </a:ext>
+            </a:extLst>
+          </p:cNvPr>
+          <p:cNvSpPr>
+            <a:spLocks noGrp="1"/>
+          </p:cNvSpPr>
+          <p:nvPr>
+            <p:ph type="sldNum" sz="quarter" idx="12"/>
+          </p:nvPr>
+        </p:nvSpPr>
+        <p:spPr/>
+        <p:txBody>
+          <a:bodyPr/>
+          <a:lstStyle/>
+          <a:p>
+            <a:fld id="{220513D4-7261-F848-8FAE-CF02B39A77BD}" type="slidenum">
+              <a:rPr lang="en-US" smtClean="0"/>
+              <a:t>23</a:t>
+            </a:fld>
+            <a:endParaRPr lang="en-US"/>
+          </a:p>
+        </p:txBody>
+      </p:sp>
+      <p:sp>
+        <p:nvSpPr>
+          <p:cNvPr id="4" name="TextBox 3">
+            <a:extLst>
+              <a:ext uri="{FF2B5EF4-FFF2-40B4-BE49-F238E27FC236}">
+                <a16:creationId xmlns:a16="http://schemas.microsoft.com/office/drawing/2014/main" id="{A2BDE0F2-E606-F199-E6FE-2DF09AF86540}"/>
+              </a:ext>
+            </a:extLst>
+          </p:cNvPr>
+          <p:cNvSpPr txBox="1"/>
+          <p:nvPr/>
+        </p:nvSpPr>
+        <p:spPr>
+          <a:xfrm>
+            <a:off x="1061514" y="1798277"/>
+            <a:ext cx="7210307" cy="3139321"/>
+          </a:xfrm>
+          <a:prstGeom prst="rect">
+            <a:avLst/>
+          </a:prstGeom>
+          <a:noFill/>
+        </p:spPr>
+        <p:txBody>
+          <a:bodyPr wrap="none" rtlCol="0">
+            <a:spAutoFit/>
+          </a:bodyPr>
+          <a:lstStyle/>
+          <a:p>
+            <a:r>
+              <a:rPr lang="en-US" dirty="0"/>
+              <a:t>Considerations: Scaling/Factor of CURVE for different location</a:t>
+            </a:r>
+          </a:p>
+          <a:p>
+            <a:r>
+              <a:rPr lang="en-US" dirty="0"/>
+              <a:t>Users :</a:t>
+            </a:r>
+          </a:p>
+          <a:p>
+            <a:r>
+              <a:rPr lang="en-US" dirty="0"/>
+              <a:t>	Super user (specific buildings)</a:t>
+            </a:r>
+          </a:p>
+          <a:p>
+            <a:r>
+              <a:rPr lang="en-US" dirty="0"/>
+              <a:t>	Community/Regional </a:t>
+            </a:r>
+          </a:p>
+          <a:p>
+            <a:r>
+              <a:rPr lang="en-US" dirty="0"/>
+              <a:t>	?</a:t>
+            </a:r>
+          </a:p>
+          <a:p>
+            <a:endParaRPr lang="en-US" dirty="0"/>
+          </a:p>
+          <a:p>
+            <a:r>
+              <a:rPr lang="en-US" b="1" dirty="0"/>
+              <a:t>Focus more on loading curves and translation to different times/places?</a:t>
+            </a:r>
+          </a:p>
+          <a:p>
+            <a:r>
+              <a:rPr lang="en-US" b="1" dirty="0"/>
+              <a:t>-find out those typical curves. </a:t>
+            </a:r>
+          </a:p>
+          <a:p>
+            <a:r>
+              <a:rPr lang="en-US" b="1" dirty="0"/>
+              <a:t>StatsCan – typical homes. </a:t>
+            </a:r>
+            <a:r>
+              <a:rPr lang="en-US" b="1"/>
+              <a:t>Simple categories. </a:t>
+            </a:r>
+            <a:endParaRPr lang="en-US" b="1" dirty="0"/>
+          </a:p>
+          <a:p>
+            <a:r>
+              <a:rPr lang="en-US" dirty="0"/>
+              <a:t> </a:t>
+            </a:r>
+          </a:p>
+          <a:p>
+            <a:endParaRPr lang="en-US" dirty="0"/>
+          </a:p>
+        </p:txBody>
+      </p:sp>
+    </p:spTree>
+    <p:extLst>
+      <p:ext uri="{BB962C8B-B14F-4D97-AF65-F5344CB8AC3E}">
+        <p14:creationId xmlns:p14="http://schemas.microsoft.com/office/powerpoint/2010/main" val="1253239580"/>
+      </p:ext>
+    </p:extLst>
+  </p:cSld>
+  <p:clrMapOvr>
+    <a:masterClrMapping/>
+  </p:clrMapOvr>
+</p:sld>
+</file>
+
+<file path=ppt/slides/slide24.xml><?xml version="1.0" encoding="utf-8"?>
+<p:sld xmlns:a="http://schemas.openxmlformats.org/drawingml/2006/main" xmlns:r="http://schemas.openxmlformats.org/officeDocument/2006/relationships" xmlns:p="http://schemas.openxmlformats.org/presentationml/2006/main">
+  <p:cSld>
+    <p:spTree>
+      <p:nvGrpSpPr>
+        <p:cNvPr id="1" name=""/>
+        <p:cNvGrpSpPr/>
+        <p:nvPr/>
+      </p:nvGrpSpPr>
+      <p:grpSpPr>
+        <a:xfrm>
+          <a:off x="0" y="0"/>
+          <a:ext cx="0" cy="0"/>
+          <a:chOff x="0" y="0"/>
+          <a:chExt cx="0" cy="0"/>
+        </a:xfrm>
+      </p:grpSpPr>
+      <p:sp>
+        <p:nvSpPr>
+          <p:cNvPr id="2" name="Title 1">
+            <a:extLst>
+              <a:ext uri="{FF2B5EF4-FFF2-40B4-BE49-F238E27FC236}">
                 <a16:creationId xmlns:a16="http://schemas.microsoft.com/office/drawing/2014/main" id="{CA508C1B-816E-353A-69DC-7C42C6C91939}"/>
               </a:ext>
             </a:extLst>
@@ -25390,7 +25572,7 @@
 </p:sld>
 </file>
 
-<file path=ppt/slides/slide24.xml><?xml version="1.0" encoding="utf-8"?>
+<file path=ppt/slides/slide25.xml><?xml version="1.0" encoding="utf-8"?>
 <p:sld xmlns:a="http://schemas.openxmlformats.org/drawingml/2006/main" xmlns:r="http://schemas.openxmlformats.org/officeDocument/2006/relationships" xmlns:p="http://schemas.openxmlformats.org/presentationml/2006/main">
   <p:cSld>
     <p:spTree>
@@ -26205,7 +26387,7 @@
 </p:sld>
 </file>
 
-<file path=ppt/slides/slide25.xml><?xml version="1.0" encoding="utf-8"?>
+<file path=ppt/slides/slide26.xml><?xml version="1.0" encoding="utf-8"?>
 <p:sld xmlns:a="http://schemas.openxmlformats.org/drawingml/2006/main" xmlns:r="http://schemas.openxmlformats.org/officeDocument/2006/relationships" xmlns:p="http://schemas.openxmlformats.org/presentationml/2006/main">
   <p:cSld>
     <p:spTree>
@@ -26305,7 +26487,7 @@
             <a:fld id="{8395A67B-D0FE-F448-80B1-1191BC67A3E6}" type="slidenum">
               <a:rPr lang="en-US" smtClean="0"/>
               <a:pPr/>
-              <a:t>25</a:t>
+              <a:t>26</a:t>
             </a:fld>
             <a:endParaRPr lang="en-US"/>
           </a:p>
@@ -26324,7 +26506,7 @@
 </p:sld>
 </file>
 
-<file path=ppt/slides/slide26.xml><?xml version="1.0" encoding="utf-8"?>
+<file path=ppt/slides/slide27.xml><?xml version="1.0" encoding="utf-8"?>
 <p:sld xmlns:a="http://schemas.openxmlformats.org/drawingml/2006/main" xmlns:r="http://schemas.openxmlformats.org/officeDocument/2006/relationships" xmlns:p="http://schemas.openxmlformats.org/presentationml/2006/main">
   <p:cSld>
     <p:spTree>
@@ -26839,7 +27021,7 @@
 </p:sld>
 </file>
 
-<file path=ppt/slides/slide27.xml><?xml version="1.0" encoding="utf-8"?>
+<file path=ppt/slides/slide28.xml><?xml version="1.0" encoding="utf-8"?>
 <p:sld xmlns:a="http://schemas.openxmlformats.org/drawingml/2006/main" xmlns:r="http://schemas.openxmlformats.org/officeDocument/2006/relationships" xmlns:p="http://schemas.openxmlformats.org/presentationml/2006/main">
   <p:cSld>
     <p:spTree>
@@ -34811,7 +34993,7 @@
 </p:sld>
 </file>
 
-<file path=ppt/slides/slide28.xml><?xml version="1.0" encoding="utf-8"?>
+<file path=ppt/slides/slide29.xml><?xml version="1.0" encoding="utf-8"?>
 <p:sld xmlns:a="http://schemas.openxmlformats.org/drawingml/2006/main" xmlns:r="http://schemas.openxmlformats.org/officeDocument/2006/relationships" xmlns:p="http://schemas.openxmlformats.org/presentationml/2006/main">
   <p:cSld>
     <p:spTree>
@@ -34943,66 +35125,6 @@
     <p:extLst>
       <p:ext uri="{BB962C8B-B14F-4D97-AF65-F5344CB8AC3E}">
         <p14:creationId xmlns:p14="http://schemas.microsoft.com/office/powerpoint/2010/main" val="2047972088"/>
-      </p:ext>
-    </p:extLst>
-  </p:cSld>
-  <p:clrMapOvr>
-    <a:masterClrMapping/>
-  </p:clrMapOvr>
-</p:sld>
-</file>
-
-<file path=ppt/slides/slide29.xml><?xml version="1.0" encoding="utf-8"?>
-<p:sld xmlns:a="http://schemas.openxmlformats.org/drawingml/2006/main" xmlns:r="http://schemas.openxmlformats.org/officeDocument/2006/relationships" xmlns:p="http://schemas.openxmlformats.org/presentationml/2006/main">
-  <p:cSld>
-    <p:spTree>
-      <p:nvGrpSpPr>
-        <p:cNvPr id="1" name=""/>
-        <p:cNvGrpSpPr/>
-        <p:nvPr/>
-      </p:nvGrpSpPr>
-      <p:grpSpPr>
-        <a:xfrm>
-          <a:off x="0" y="0"/>
-          <a:ext cx="0" cy="0"/>
-          <a:chOff x="0" y="0"/>
-          <a:chExt cx="0" cy="0"/>
-        </a:xfrm>
-      </p:grpSpPr>
-      <p:pic>
-        <p:nvPicPr>
-          <p:cNvPr id="10" name="Picture 9">
-            <a:extLst>
-              <a:ext uri="{FF2B5EF4-FFF2-40B4-BE49-F238E27FC236}">
-                <a16:creationId xmlns:a16="http://schemas.microsoft.com/office/drawing/2014/main" id="{EC0D20E0-2DAE-8ACC-742F-634B583BB2BC}"/>
-              </a:ext>
-            </a:extLst>
-          </p:cNvPr>
-          <p:cNvPicPr>
-            <a:picLocks noChangeAspect="1"/>
-          </p:cNvPicPr>
-          <p:nvPr/>
-        </p:nvPicPr>
-        <p:blipFill>
-          <a:blip r:embed="rId2"/>
-          <a:stretch>
-            <a:fillRect/>
-          </a:stretch>
-        </p:blipFill>
-        <p:spPr>
-          <a:xfrm>
-            <a:off x="1311382" y="94784"/>
-            <a:ext cx="8811855" cy="6668431"/>
-          </a:xfrm>
-          <a:prstGeom prst="rect">
-            <a:avLst/>
-          </a:prstGeom>
-        </p:spPr>
-      </p:pic>
-    </p:spTree>
-    <p:extLst>
-      <p:ext uri="{BB962C8B-B14F-4D97-AF65-F5344CB8AC3E}">
-        <p14:creationId xmlns:p14="http://schemas.microsoft.com/office/powerpoint/2010/main" val="2231786723"/>
       </p:ext>
     </p:extLst>
   </p:cSld>
@@ -35282,6 +35404,66 @@
           <a:chExt cx="0" cy="0"/>
         </a:xfrm>
       </p:grpSpPr>
+      <p:pic>
+        <p:nvPicPr>
+          <p:cNvPr id="10" name="Picture 9">
+            <a:extLst>
+              <a:ext uri="{FF2B5EF4-FFF2-40B4-BE49-F238E27FC236}">
+                <a16:creationId xmlns:a16="http://schemas.microsoft.com/office/drawing/2014/main" id="{EC0D20E0-2DAE-8ACC-742F-634B583BB2BC}"/>
+              </a:ext>
+            </a:extLst>
+          </p:cNvPr>
+          <p:cNvPicPr>
+            <a:picLocks noChangeAspect="1"/>
+          </p:cNvPicPr>
+          <p:nvPr/>
+        </p:nvPicPr>
+        <p:blipFill>
+          <a:blip r:embed="rId2"/>
+          <a:stretch>
+            <a:fillRect/>
+          </a:stretch>
+        </p:blipFill>
+        <p:spPr>
+          <a:xfrm>
+            <a:off x="1311382" y="94784"/>
+            <a:ext cx="8811855" cy="6668431"/>
+          </a:xfrm>
+          <a:prstGeom prst="rect">
+            <a:avLst/>
+          </a:prstGeom>
+        </p:spPr>
+      </p:pic>
+    </p:spTree>
+    <p:extLst>
+      <p:ext uri="{BB962C8B-B14F-4D97-AF65-F5344CB8AC3E}">
+        <p14:creationId xmlns:p14="http://schemas.microsoft.com/office/powerpoint/2010/main" val="2231786723"/>
+      </p:ext>
+    </p:extLst>
+  </p:cSld>
+  <p:clrMapOvr>
+    <a:masterClrMapping/>
+  </p:clrMapOvr>
+</p:sld>
+</file>
+
+<file path=ppt/slides/slide31.xml><?xml version="1.0" encoding="utf-8"?>
+<p:sld xmlns:a="http://schemas.openxmlformats.org/drawingml/2006/main" xmlns:r="http://schemas.openxmlformats.org/officeDocument/2006/relationships" xmlns:p="http://schemas.openxmlformats.org/presentationml/2006/main">
+  <p:cSld>
+    <p:spTree>
+      <p:nvGrpSpPr>
+        <p:cNvPr id="1" name=""/>
+        <p:cNvGrpSpPr/>
+        <p:nvPr/>
+      </p:nvGrpSpPr>
+      <p:grpSpPr>
+        <a:xfrm>
+          <a:off x="0" y="0"/>
+          <a:ext cx="0" cy="0"/>
+          <a:chOff x="0" y="0"/>
+          <a:chExt cx="0" cy="0"/>
+        </a:xfrm>
+      </p:grpSpPr>
       <p:sp>
         <p:nvSpPr>
           <p:cNvPr id="2" name="Title 1">
@@ -35352,7 +35534,7 @@
 </p:sld>
 </file>
 
-<file path=ppt/slides/slide31.xml><?xml version="1.0" encoding="utf-8"?>
+<file path=ppt/slides/slide32.xml><?xml version="1.0" encoding="utf-8"?>
 <p:sld xmlns:a="http://schemas.openxmlformats.org/drawingml/2006/main" xmlns:r="http://schemas.openxmlformats.org/officeDocument/2006/relationships" xmlns:p="http://schemas.openxmlformats.org/presentationml/2006/main">
   <p:cSld>
     <p:spTree>
@@ -35444,7 +35626,7 @@
 </p:sld>
 </file>
 
-<file path=ppt/slides/slide32.xml><?xml version="1.0" encoding="utf-8"?>
+<file path=ppt/slides/slide33.xml><?xml version="1.0" encoding="utf-8"?>
 <p:sld xmlns:a="http://schemas.openxmlformats.org/drawingml/2006/main" xmlns:r="http://schemas.openxmlformats.org/officeDocument/2006/relationships" xmlns:p="http://schemas.openxmlformats.org/presentationml/2006/main">
   <p:cSld>
     <p:spTree>
@@ -38311,7 +38493,7 @@
 </p:sld>
 </file>
 
-<file path=ppt/slides/slide33.xml><?xml version="1.0" encoding="utf-8"?>
+<file path=ppt/slides/slide34.xml><?xml version="1.0" encoding="utf-8"?>
 <p:sld xmlns:a="http://schemas.openxmlformats.org/drawingml/2006/main" xmlns:r="http://schemas.openxmlformats.org/officeDocument/2006/relationships" xmlns:p="http://schemas.openxmlformats.org/presentationml/2006/main">
   <p:cSld>
     <p:spTree>
@@ -40956,7 +41138,7 @@
 </p:sld>
 </file>
 
-<file path=ppt/slides/slide34.xml><?xml version="1.0" encoding="utf-8"?>
+<file path=ppt/slides/slide35.xml><?xml version="1.0" encoding="utf-8"?>
 <p:sld xmlns:a="http://schemas.openxmlformats.org/drawingml/2006/main" xmlns:r="http://schemas.openxmlformats.org/officeDocument/2006/relationships" xmlns:p="http://schemas.openxmlformats.org/presentationml/2006/main">
   <p:cSld>
     <p:spTree>
@@ -41445,7 +41627,7 @@
 </p:sld>
 </file>
 
-<file path=ppt/slides/slide35.xml><?xml version="1.0" encoding="utf-8"?>
+<file path=ppt/slides/slide36.xml><?xml version="1.0" encoding="utf-8"?>
 <p:sld xmlns:a="http://schemas.openxmlformats.org/drawingml/2006/main" xmlns:r="http://schemas.openxmlformats.org/officeDocument/2006/relationships" xmlns:p="http://schemas.openxmlformats.org/presentationml/2006/main">
   <p:cSld>
     <p:spTree>
@@ -41693,7 +41875,7 @@
 </p:sld>
 </file>
 
-<file path=ppt/slides/slide36.xml><?xml version="1.0" encoding="utf-8"?>
+<file path=ppt/slides/slide37.xml><?xml version="1.0" encoding="utf-8"?>
 <p:sld xmlns:a="http://schemas.openxmlformats.org/drawingml/2006/main" xmlns:r="http://schemas.openxmlformats.org/officeDocument/2006/relationships" xmlns:p="http://schemas.openxmlformats.org/presentationml/2006/main">
   <p:cSld>
     <p:spTree>
@@ -42980,7 +43162,7 @@
 
 <file path=ppt/tags/tag1.xml><?xml version="1.0" encoding="utf-8"?>
 <p:tagLst xmlns:a="http://schemas.openxmlformats.org/drawingml/2006/main" xmlns:r="http://schemas.openxmlformats.org/officeDocument/2006/relationships" xmlns:p="http://schemas.openxmlformats.org/presentationml/2006/main">
-  <p:tag name="ENGAGE" val="{&quot;SavedSwatch&quot;:&quot;-11240108|-11700327|-8754175|-9605520|-12039861|NRCan&quot;,&quot;Id&quot;:&quot;65fb2df53038433ad40ecbd5&quot;,&quot;SmartGridHorizontal&quot;:0,&quot;LinkedExcelSources&quot;:{},&quot;LinkedProjectSources&quot;:{},&quot;FlowConfig&quot;:{&quot;Canvas&quot;:{&quot;Slide&quot;:-1,&quot;Width&quot;:0,&quot;Height&quot;:0},&quot;Timeline&quot;:{&quot;Actions&quot;:[]}},&quot;LinkedSlideMergeSources&quot;:{},&quot;LinkedSharePointSlideMergeSources&quot;:{}}"/>
+  <p:tag name="ENGAGE" val="{&quot;SavedSwatch&quot;:&quot;-11240108|-11700327|-8754175|-9605520|-12039861|NRCan&quot;,&quot;Id&quot;:&quot;65fc66413038433ff8960df6&quot;,&quot;SmartGridHorizontal&quot;:0,&quot;LinkedExcelSources&quot;:{},&quot;LinkedProjectSources&quot;:{},&quot;FlowConfig&quot;:{&quot;Canvas&quot;:{&quot;Slide&quot;:-1,&quot;Width&quot;:0,&quot;Height&quot;:0},&quot;Timeline&quot;:{&quot;Actions&quot;:[]}},&quot;LinkedSlideMergeSources&quot;:{},&quot;LinkedSharePointSlideMergeSources&quot;:{}}"/>
 </p:tagLst>
 </file>
 

</xml_diff>